<commit_message>
Updated partners and texts
</commit_message>
<xml_diff>
--- a/images/images.pptx
+++ b/images/images.pptx
@@ -262,7 +262,7 @@
           <a:p>
             <a:fld id="{0CA98310-289E-4EC8-9A3E-CFFF37C28B87}" type="datetimeFigureOut">
               <a:rPr lang="en-US" smtClean="0"/>
-              <a:t>12/8/2025</a:t>
+              <a:t>12/9/2025</a:t>
             </a:fld>
             <a:endParaRPr lang="en-US"/>
           </a:p>
@@ -462,7 +462,7 @@
           <a:p>
             <a:fld id="{0CA98310-289E-4EC8-9A3E-CFFF37C28B87}" type="datetimeFigureOut">
               <a:rPr lang="en-US" smtClean="0"/>
-              <a:t>12/8/2025</a:t>
+              <a:t>12/9/2025</a:t>
             </a:fld>
             <a:endParaRPr lang="en-US"/>
           </a:p>
@@ -672,7 +672,7 @@
           <a:p>
             <a:fld id="{0CA98310-289E-4EC8-9A3E-CFFF37C28B87}" type="datetimeFigureOut">
               <a:rPr lang="en-US" smtClean="0"/>
-              <a:t>12/8/2025</a:t>
+              <a:t>12/9/2025</a:t>
             </a:fld>
             <a:endParaRPr lang="en-US"/>
           </a:p>
@@ -872,7 +872,7 @@
           <a:p>
             <a:fld id="{0CA98310-289E-4EC8-9A3E-CFFF37C28B87}" type="datetimeFigureOut">
               <a:rPr lang="en-US" smtClean="0"/>
-              <a:t>12/8/2025</a:t>
+              <a:t>12/9/2025</a:t>
             </a:fld>
             <a:endParaRPr lang="en-US"/>
           </a:p>
@@ -1148,7 +1148,7 @@
           <a:p>
             <a:fld id="{0CA98310-289E-4EC8-9A3E-CFFF37C28B87}" type="datetimeFigureOut">
               <a:rPr lang="en-US" smtClean="0"/>
-              <a:t>12/8/2025</a:t>
+              <a:t>12/9/2025</a:t>
             </a:fld>
             <a:endParaRPr lang="en-US"/>
           </a:p>
@@ -1416,7 +1416,7 @@
           <a:p>
             <a:fld id="{0CA98310-289E-4EC8-9A3E-CFFF37C28B87}" type="datetimeFigureOut">
               <a:rPr lang="en-US" smtClean="0"/>
-              <a:t>12/8/2025</a:t>
+              <a:t>12/9/2025</a:t>
             </a:fld>
             <a:endParaRPr lang="en-US"/>
           </a:p>
@@ -1831,7 +1831,7 @@
           <a:p>
             <a:fld id="{0CA98310-289E-4EC8-9A3E-CFFF37C28B87}" type="datetimeFigureOut">
               <a:rPr lang="en-US" smtClean="0"/>
-              <a:t>12/8/2025</a:t>
+              <a:t>12/9/2025</a:t>
             </a:fld>
             <a:endParaRPr lang="en-US"/>
           </a:p>
@@ -1973,7 +1973,7 @@
           <a:p>
             <a:fld id="{0CA98310-289E-4EC8-9A3E-CFFF37C28B87}" type="datetimeFigureOut">
               <a:rPr lang="en-US" smtClean="0"/>
-              <a:t>12/8/2025</a:t>
+              <a:t>12/9/2025</a:t>
             </a:fld>
             <a:endParaRPr lang="en-US"/>
           </a:p>
@@ -2086,7 +2086,7 @@
           <a:p>
             <a:fld id="{0CA98310-289E-4EC8-9A3E-CFFF37C28B87}" type="datetimeFigureOut">
               <a:rPr lang="en-US" smtClean="0"/>
-              <a:t>12/8/2025</a:t>
+              <a:t>12/9/2025</a:t>
             </a:fld>
             <a:endParaRPr lang="en-US"/>
           </a:p>
@@ -2399,7 +2399,7 @@
           <a:p>
             <a:fld id="{0CA98310-289E-4EC8-9A3E-CFFF37C28B87}" type="datetimeFigureOut">
               <a:rPr lang="en-US" smtClean="0"/>
-              <a:t>12/8/2025</a:t>
+              <a:t>12/9/2025</a:t>
             </a:fld>
             <a:endParaRPr lang="en-US"/>
           </a:p>
@@ -2688,7 +2688,7 @@
           <a:p>
             <a:fld id="{0CA98310-289E-4EC8-9A3E-CFFF37C28B87}" type="datetimeFigureOut">
               <a:rPr lang="en-US" smtClean="0"/>
-              <a:t>12/8/2025</a:t>
+              <a:t>12/9/2025</a:t>
             </a:fld>
             <a:endParaRPr lang="en-US"/>
           </a:p>
@@ -2931,7 +2931,7 @@
           <a:p>
             <a:fld id="{0CA98310-289E-4EC8-9A3E-CFFF37C28B87}" type="datetimeFigureOut">
               <a:rPr lang="en-US" smtClean="0"/>
-              <a:t>12/8/2025</a:t>
+              <a:t>12/9/2025</a:t>
             </a:fld>
             <a:endParaRPr lang="en-US"/>
           </a:p>
@@ -3710,6 +3710,63 @@
           <a:prstGeom prst="rect">
             <a:avLst/>
           </a:prstGeom>
+        </p:spPr>
+      </p:pic>
+      <p:pic>
+        <p:nvPicPr>
+          <p:cNvPr id="1026" name="Picture 2">
+            <a:extLst>
+              <a:ext uri="{FF2B5EF4-FFF2-40B4-BE49-F238E27FC236}">
+                <a16:creationId xmlns:a16="http://schemas.microsoft.com/office/drawing/2014/main" id="{36E3EE79-0C72-80A5-7BBB-F5A3CFDD9F23}"/>
+              </a:ext>
+            </a:extLst>
+          </p:cNvPr>
+          <p:cNvPicPr>
+            <a:picLocks noChangeAspect="1" noChangeArrowheads="1"/>
+          </p:cNvPicPr>
+          <p:nvPr/>
+        </p:nvPicPr>
+        <p:blipFill>
+          <a:blip r:embed="rId4">
+            <a:clrChange>
+              <a:clrFrom>
+                <a:srgbClr val="FFFFFF"/>
+              </a:clrFrom>
+              <a:clrTo>
+                <a:srgbClr val="FFFFFF">
+                  <a:alpha val="0"/>
+                </a:srgbClr>
+              </a:clrTo>
+            </a:clrChange>
+            <a:extLst>
+              <a:ext uri="{28A0092B-C50C-407E-A947-70E740481C1C}">
+                <a14:useLocalDpi xmlns:a14="http://schemas.microsoft.com/office/drawing/2010/main" val="0"/>
+              </a:ext>
+            </a:extLst>
+          </a:blip>
+          <a:srcRect/>
+          <a:stretch>
+            <a:fillRect/>
+          </a:stretch>
+        </p:blipFill>
+        <p:spPr bwMode="auto">
+          <a:xfrm>
+            <a:off x="4667250" y="2605627"/>
+            <a:ext cx="2857500" cy="904875"/>
+          </a:xfrm>
+          <a:prstGeom prst="rect">
+            <a:avLst/>
+          </a:prstGeom>
+          <a:noFill/>
+          <a:extLst>
+            <a:ext uri="{909E8E84-426E-40DD-AFC4-6F175D3DCCD1}">
+              <a14:hiddenFill xmlns:a14="http://schemas.microsoft.com/office/drawing/2010/main">
+                <a:solidFill>
+                  <a:srgbClr val="FFFFFF"/>
+                </a:solidFill>
+              </a14:hiddenFill>
+            </a:ext>
+          </a:extLst>
         </p:spPr>
       </p:pic>
     </p:spTree>

</xml_diff>